<commit_message>
DeepHunter: A Coverage-Guided Fuzz Testing Framework for Deep Neural Networks
</commit_message>
<xml_diff>
--- a/Presentation/20190828_Rabin.pptx
+++ b/Presentation/20190828_Rabin.pptx
@@ -227,7 +227,7 @@
             <a:fld id="{CB3D2ACE-279A-4319-8204-FE4A3DAF1277}" type="datetimeFigureOut">
               <a:rPr lang="en-US" smtClean="0"/>
               <a:pPr/>
-              <a:t>8/29/19</a:t>
+              <a:t>9/5/19</a:t>
             </a:fld>
             <a:endParaRPr lang="en-US"/>
           </a:p>
@@ -3597,7 +3597,7 @@
             <a:fld id="{B61BEF0D-F0BB-DE4B-95CE-6DB70DBA9567}" type="datetimeFigureOut">
               <a:rPr lang="en-US" smtClean="0"/>
               <a:pPr/>
-              <a:t>8/29/19</a:t>
+              <a:t>9/5/19</a:t>
             </a:fld>
             <a:endParaRPr lang="en-US" dirty="0"/>
           </a:p>
@@ -3778,7 +3778,7 @@
             <a:fld id="{B61BEF0D-F0BB-DE4B-95CE-6DB70DBA9567}" type="datetimeFigureOut">
               <a:rPr lang="en-US" smtClean="0"/>
               <a:pPr/>
-              <a:t>8/29/19</a:t>
+              <a:t>9/5/19</a:t>
             </a:fld>
             <a:endParaRPr lang="en-US" dirty="0"/>
           </a:p>
@@ -3960,7 +3960,7 @@
             <a:fld id="{B61BEF0D-F0BB-DE4B-95CE-6DB70DBA9567}" type="datetimeFigureOut">
               <a:rPr lang="en-US" smtClean="0"/>
               <a:pPr/>
-              <a:t>8/29/19</a:t>
+              <a:t>9/5/19</a:t>
             </a:fld>
             <a:endParaRPr lang="en-US" dirty="0"/>
           </a:p>
@@ -4132,7 +4132,7 @@
             <a:fld id="{B61BEF0D-F0BB-DE4B-95CE-6DB70DBA9567}" type="datetimeFigureOut">
               <a:rPr lang="en-US" smtClean="0"/>
               <a:pPr/>
-              <a:t>8/29/19</a:t>
+              <a:t>9/5/19</a:t>
             </a:fld>
             <a:endParaRPr lang="en-US" dirty="0"/>
           </a:p>
@@ -4447,7 +4447,7 @@
             <a:fld id="{B61BEF0D-F0BB-DE4B-95CE-6DB70DBA9567}" type="datetimeFigureOut">
               <a:rPr lang="en-US" smtClean="0"/>
               <a:pPr/>
-              <a:t>8/29/19</a:t>
+              <a:t>9/5/19</a:t>
             </a:fld>
             <a:endParaRPr lang="en-US" dirty="0"/>
           </a:p>
@@ -4835,7 +4835,7 @@
             <a:fld id="{B61BEF0D-F0BB-DE4B-95CE-6DB70DBA9567}" type="datetimeFigureOut">
               <a:rPr lang="en-US" smtClean="0"/>
               <a:pPr/>
-              <a:t>8/29/19</a:t>
+              <a:t>9/5/19</a:t>
             </a:fld>
             <a:endParaRPr lang="en-US" dirty="0"/>
           </a:p>
@@ -5271,7 +5271,7 @@
             <a:fld id="{B61BEF0D-F0BB-DE4B-95CE-6DB70DBA9567}" type="datetimeFigureOut">
               <a:rPr lang="en-US" smtClean="0"/>
               <a:pPr/>
-              <a:t>8/29/19</a:t>
+              <a:t>9/5/19</a:t>
             </a:fld>
             <a:endParaRPr lang="en-US" dirty="0"/>
           </a:p>
@@ -5391,7 +5391,7 @@
             <a:fld id="{B61BEF0D-F0BB-DE4B-95CE-6DB70DBA9567}" type="datetimeFigureOut">
               <a:rPr lang="en-US" smtClean="0"/>
               <a:pPr/>
-              <a:t>8/29/19</a:t>
+              <a:t>9/5/19</a:t>
             </a:fld>
             <a:endParaRPr lang="en-US" dirty="0"/>
           </a:p>
@@ -5488,7 +5488,7 @@
             <a:fld id="{B61BEF0D-F0BB-DE4B-95CE-6DB70DBA9567}" type="datetimeFigureOut">
               <a:rPr lang="en-US" smtClean="0"/>
               <a:pPr/>
-              <a:t>8/29/19</a:t>
+              <a:t>9/5/19</a:t>
             </a:fld>
             <a:endParaRPr lang="en-US" dirty="0"/>
           </a:p>
@@ -5840,7 +5840,7 @@
             <a:fld id="{B61BEF0D-F0BB-DE4B-95CE-6DB70DBA9567}" type="datetimeFigureOut">
               <a:rPr lang="en-US" smtClean="0"/>
               <a:pPr/>
-              <a:t>8/29/19</a:t>
+              <a:t>9/5/19</a:t>
             </a:fld>
             <a:endParaRPr lang="en-US" dirty="0"/>
           </a:p>
@@ -6267,7 +6267,7 @@
             <a:fld id="{B61BEF0D-F0BB-DE4B-95CE-6DB70DBA9567}" type="datetimeFigureOut">
               <a:rPr lang="en-US" smtClean="0"/>
               <a:pPr/>
-              <a:t>8/29/19</a:t>
+              <a:t>9/5/19</a:t>
             </a:fld>
             <a:endParaRPr lang="en-US" dirty="0"/>
           </a:p>
@@ -6550,7 +6550,7 @@
             <a:fld id="{B61BEF0D-F0BB-DE4B-95CE-6DB70DBA9567}" type="datetimeFigureOut">
               <a:rPr lang="en-US" smtClean="0"/>
               <a:pPr/>
-              <a:t>8/29/19</a:t>
+              <a:t>9/5/19</a:t>
             </a:fld>
             <a:endParaRPr lang="en-US" dirty="0"/>
           </a:p>

</xml_diff>